<commit_message>
Updated Day2 text for wayfinder powerpoint
</commit_message>
<xml_diff>
--- a/images/source/RSD_workshop_wayfinder.pptx
+++ b/images/source/RSD_workshop_wayfinder.pptx
@@ -54128,7 +54128,7 @@
           <a:p>
             <a:fld id="{C36F1AEA-0188-C248-BDA1-4EAD0618F94F}" type="datetimeFigureOut">
               <a:rPr lang="en-US" smtClean="0"/>
-              <a:t>7/28/21</a:t>
+              <a:t>8/3/21</a:t>
             </a:fld>
             <a:endParaRPr lang="en-US"/>
           </a:p>
@@ -54326,7 +54326,7 @@
           <a:p>
             <a:fld id="{C36F1AEA-0188-C248-BDA1-4EAD0618F94F}" type="datetimeFigureOut">
               <a:rPr lang="en-US" smtClean="0"/>
-              <a:t>7/28/21</a:t>
+              <a:t>8/3/21</a:t>
             </a:fld>
             <a:endParaRPr lang="en-US"/>
           </a:p>
@@ -54534,7 +54534,7 @@
           <a:p>
             <a:fld id="{C36F1AEA-0188-C248-BDA1-4EAD0618F94F}" type="datetimeFigureOut">
               <a:rPr lang="en-US" smtClean="0"/>
-              <a:t>7/28/21</a:t>
+              <a:t>8/3/21</a:t>
             </a:fld>
             <a:endParaRPr lang="en-US"/>
           </a:p>
@@ -54732,7 +54732,7 @@
           <a:p>
             <a:fld id="{C36F1AEA-0188-C248-BDA1-4EAD0618F94F}" type="datetimeFigureOut">
               <a:rPr lang="en-US" smtClean="0"/>
-              <a:t>7/28/21</a:t>
+              <a:t>8/3/21</a:t>
             </a:fld>
             <a:endParaRPr lang="en-US"/>
           </a:p>
@@ -55007,7 +55007,7 @@
           <a:p>
             <a:fld id="{C36F1AEA-0188-C248-BDA1-4EAD0618F94F}" type="datetimeFigureOut">
               <a:rPr lang="en-US" smtClean="0"/>
-              <a:t>7/28/21</a:t>
+              <a:t>8/3/21</a:t>
             </a:fld>
             <a:endParaRPr lang="en-US"/>
           </a:p>
@@ -55272,7 +55272,7 @@
           <a:p>
             <a:fld id="{C36F1AEA-0188-C248-BDA1-4EAD0618F94F}" type="datetimeFigureOut">
               <a:rPr lang="en-US" smtClean="0"/>
-              <a:t>7/28/21</a:t>
+              <a:t>8/3/21</a:t>
             </a:fld>
             <a:endParaRPr lang="en-US"/>
           </a:p>
@@ -55684,7 +55684,7 @@
           <a:p>
             <a:fld id="{C36F1AEA-0188-C248-BDA1-4EAD0618F94F}" type="datetimeFigureOut">
               <a:rPr lang="en-US" smtClean="0"/>
-              <a:t>7/28/21</a:t>
+              <a:t>8/3/21</a:t>
             </a:fld>
             <a:endParaRPr lang="en-US"/>
           </a:p>
@@ -55825,7 +55825,7 @@
           <a:p>
             <a:fld id="{C36F1AEA-0188-C248-BDA1-4EAD0618F94F}" type="datetimeFigureOut">
               <a:rPr lang="en-US" smtClean="0"/>
-              <a:t>7/28/21</a:t>
+              <a:t>8/3/21</a:t>
             </a:fld>
             <a:endParaRPr lang="en-US"/>
           </a:p>
@@ -55938,7 +55938,7 @@
           <a:p>
             <a:fld id="{C36F1AEA-0188-C248-BDA1-4EAD0618F94F}" type="datetimeFigureOut">
               <a:rPr lang="en-US" smtClean="0"/>
-              <a:t>7/28/21</a:t>
+              <a:t>8/3/21</a:t>
             </a:fld>
             <a:endParaRPr lang="en-US"/>
           </a:p>
@@ -56249,7 +56249,7 @@
           <a:p>
             <a:fld id="{C36F1AEA-0188-C248-BDA1-4EAD0618F94F}" type="datetimeFigureOut">
               <a:rPr lang="en-US" smtClean="0"/>
-              <a:t>7/28/21</a:t>
+              <a:t>8/3/21</a:t>
             </a:fld>
             <a:endParaRPr lang="en-US"/>
           </a:p>
@@ -56537,7 +56537,7 @@
           <a:p>
             <a:fld id="{C36F1AEA-0188-C248-BDA1-4EAD0618F94F}" type="datetimeFigureOut">
               <a:rPr lang="en-US" smtClean="0"/>
-              <a:t>7/28/21</a:t>
+              <a:t>8/3/21</a:t>
             </a:fld>
             <a:endParaRPr lang="en-US"/>
           </a:p>
@@ -56778,7 +56778,7 @@
           <a:p>
             <a:fld id="{C36F1AEA-0188-C248-BDA1-4EAD0618F94F}" type="datetimeFigureOut">
               <a:rPr lang="en-US" smtClean="0"/>
-              <a:t>7/28/21</a:t>
+              <a:t>8/3/21</a:t>
             </a:fld>
             <a:endParaRPr lang="en-US"/>
           </a:p>
@@ -58543,13 +58543,18 @@
                 <a:buNone/>
               </a:pPr>
               <a:r>
-                <a:rPr lang="en-US" sz="3400" kern="1200" dirty="0">
+                <a:rPr lang="en-US" sz="3200" dirty="0">
                   <a:solidFill>
                     <a:schemeClr val="tx1"/>
                   </a:solidFill>
                 </a:rPr>
-                <a:t>model gene expression</a:t>
+                <a:t>Define groups &amp; fit Model</a:t>
               </a:r>
+              <a:endParaRPr lang="en-US" sz="3200" kern="1200" dirty="0">
+                <a:solidFill>
+                  <a:schemeClr val="tx1"/>
+                </a:solidFill>
+              </a:endParaRPr>
             </a:p>
           </p:txBody>
         </p:sp>
@@ -58677,7 +58682,7 @@
             </a:bodyPr>
             <a:lstStyle/>
             <a:p>
-              <a:pPr marL="0" lvl="0" indent="0" algn="ctr" defTabSz="1511300">
+              <a:pPr algn="ctr" defTabSz="1511300">
                 <a:lnSpc>
                   <a:spcPct val="90000"/>
                 </a:lnSpc>
@@ -58687,15 +58692,14 @@
                 <a:spcAft>
                   <a:spcPct val="35000"/>
                 </a:spcAft>
-                <a:buNone/>
               </a:pPr>
               <a:r>
-                <a:rPr lang="en-US" sz="3400" kern="1200" dirty="0">
+                <a:rPr lang="en-US" sz="3200" dirty="0">
                   <a:solidFill>
                     <a:schemeClr val="tx1"/>
                   </a:solidFill>
                 </a:rPr>
-                <a:t>differential expression</a:t>
+                <a:t>Expression plots (Sample QC)</a:t>
               </a:r>
             </a:p>
           </p:txBody>
@@ -58824,7 +58828,7 @@
             </a:bodyPr>
             <a:lstStyle/>
             <a:p>
-              <a:pPr marL="0" lvl="0" indent="0" algn="ctr" defTabSz="1511300">
+              <a:pPr algn="ctr" defTabSz="1511300">
                 <a:lnSpc>
                   <a:spcPct val="90000"/>
                 </a:lnSpc>
@@ -58834,15 +58838,14 @@
                 <a:spcAft>
                   <a:spcPct val="35000"/>
                 </a:spcAft>
-                <a:buNone/>
               </a:pPr>
               <a:r>
-                <a:rPr lang="en-US" sz="3400" kern="1200" dirty="0">
+                <a:rPr lang="en-US" sz="3000" dirty="0">
                   <a:solidFill>
                     <a:schemeClr val="tx1"/>
                   </a:solidFill>
                 </a:rPr>
-                <a:t>plotting / annotation</a:t>
+                <a:t>Differential Expression Comparisons</a:t>
               </a:r>
             </a:p>
           </p:txBody>

</xml_diff>